<commit_message>
create week 12 project and update assn 11
</commit_message>
<xml_diff>
--- a/lectures/lecture-review-week-12.pptx
+++ b/lectures/lecture-review-week-12.pptx
@@ -265,7 +265,7 @@
           <a:p>
             <a:fld id="{DAC1E4EF-1A07-8740-80B6-D041CCD5E262}" type="datetimeFigureOut">
               <a:rPr lang="en-US" smtClean="0"/>
-              <a:t>4/9/18</a:t>
+              <a:t>4/28/18</a:t>
             </a:fld>
             <a:endParaRPr lang="en-US"/>
           </a:p>
@@ -463,7 +463,7 @@
           <a:p>
             <a:fld id="{DAC1E4EF-1A07-8740-80B6-D041CCD5E262}" type="datetimeFigureOut">
               <a:rPr lang="en-US" smtClean="0"/>
-              <a:t>4/9/18</a:t>
+              <a:t>4/28/18</a:t>
             </a:fld>
             <a:endParaRPr lang="en-US"/>
           </a:p>
@@ -671,7 +671,7 @@
           <a:p>
             <a:fld id="{DAC1E4EF-1A07-8740-80B6-D041CCD5E262}" type="datetimeFigureOut">
               <a:rPr lang="en-US" smtClean="0"/>
-              <a:t>4/9/18</a:t>
+              <a:t>4/28/18</a:t>
             </a:fld>
             <a:endParaRPr lang="en-US"/>
           </a:p>
@@ -869,7 +869,7 @@
           <a:p>
             <a:fld id="{DAC1E4EF-1A07-8740-80B6-D041CCD5E262}" type="datetimeFigureOut">
               <a:rPr lang="en-US" smtClean="0"/>
-              <a:t>4/9/18</a:t>
+              <a:t>4/28/18</a:t>
             </a:fld>
             <a:endParaRPr lang="en-US"/>
           </a:p>
@@ -1144,7 +1144,7 @@
           <a:p>
             <a:fld id="{DAC1E4EF-1A07-8740-80B6-D041CCD5E262}" type="datetimeFigureOut">
               <a:rPr lang="en-US" smtClean="0"/>
-              <a:t>4/9/18</a:t>
+              <a:t>4/28/18</a:t>
             </a:fld>
             <a:endParaRPr lang="en-US"/>
           </a:p>
@@ -1409,7 +1409,7 @@
           <a:p>
             <a:fld id="{DAC1E4EF-1A07-8740-80B6-D041CCD5E262}" type="datetimeFigureOut">
               <a:rPr lang="en-US" smtClean="0"/>
-              <a:t>4/9/18</a:t>
+              <a:t>4/28/18</a:t>
             </a:fld>
             <a:endParaRPr lang="en-US"/>
           </a:p>
@@ -1821,7 +1821,7 @@
           <a:p>
             <a:fld id="{DAC1E4EF-1A07-8740-80B6-D041CCD5E262}" type="datetimeFigureOut">
               <a:rPr lang="en-US" smtClean="0"/>
-              <a:t>4/9/18</a:t>
+              <a:t>4/28/18</a:t>
             </a:fld>
             <a:endParaRPr lang="en-US"/>
           </a:p>
@@ -1962,7 +1962,7 @@
           <a:p>
             <a:fld id="{DAC1E4EF-1A07-8740-80B6-D041CCD5E262}" type="datetimeFigureOut">
               <a:rPr lang="en-US" smtClean="0"/>
-              <a:t>4/9/18</a:t>
+              <a:t>4/28/18</a:t>
             </a:fld>
             <a:endParaRPr lang="en-US"/>
           </a:p>
@@ -2075,7 +2075,7 @@
           <a:p>
             <a:fld id="{DAC1E4EF-1A07-8740-80B6-D041CCD5E262}" type="datetimeFigureOut">
               <a:rPr lang="en-US" smtClean="0"/>
-              <a:t>4/9/18</a:t>
+              <a:t>4/28/18</a:t>
             </a:fld>
             <a:endParaRPr lang="en-US"/>
           </a:p>
@@ -2386,7 +2386,7 @@
           <a:p>
             <a:fld id="{DAC1E4EF-1A07-8740-80B6-D041CCD5E262}" type="datetimeFigureOut">
               <a:rPr lang="en-US" smtClean="0"/>
-              <a:t>4/9/18</a:t>
+              <a:t>4/28/18</a:t>
             </a:fld>
             <a:endParaRPr lang="en-US"/>
           </a:p>
@@ -2674,7 +2674,7 @@
           <a:p>
             <a:fld id="{DAC1E4EF-1A07-8740-80B6-D041CCD5E262}" type="datetimeFigureOut">
               <a:rPr lang="en-US" smtClean="0"/>
-              <a:t>4/9/18</a:t>
+              <a:t>4/28/18</a:t>
             </a:fld>
             <a:endParaRPr lang="en-US"/>
           </a:p>
@@ -2915,7 +2915,7 @@
           <a:p>
             <a:fld id="{DAC1E4EF-1A07-8740-80B6-D041CCD5E262}" type="datetimeFigureOut">
               <a:rPr lang="en-US" smtClean="0"/>
-              <a:t>4/9/18</a:t>
+              <a:t>4/28/18</a:t>
             </a:fld>
             <a:endParaRPr lang="en-US"/>
           </a:p>
@@ -4311,7 +4311,23 @@
             <a:pPr lvl="1"/>
             <a:r>
               <a:rPr lang="en-US" dirty="0"/>
-              <a:t>TODO</a:t>
+              <a:t>Create </a:t>
+            </a:r>
+            <a:r>
+              <a:rPr lang="en-US"/>
+              <a:t>a basic Docker </a:t>
+            </a:r>
+            <a:r>
+              <a:rPr lang="en-US" dirty="0"/>
+              <a:t>container using a </a:t>
+            </a:r>
+            <a:r>
+              <a:rPr lang="en-US" dirty="0" err="1"/>
+              <a:t>Dockerfile</a:t>
+            </a:r>
+            <a:r>
+              <a:rPr lang="en-US" dirty="0"/>
+              <a:t>.</a:t>
             </a:r>
           </a:p>
           <a:p>
@@ -4320,15 +4336,7 @@
           <a:p>
             <a:r>
               <a:rPr lang="en-US" dirty="0"/>
-              <a:t>Show me </a:t>
-            </a:r>
-            <a:r>
-              <a:rPr lang="en-US"/>
-              <a:t>your work </a:t>
-            </a:r>
-            <a:r>
-              <a:rPr lang="en-US" dirty="0"/>
-              <a:t>when completed!</a:t>
+              <a:t>Show me your work when completed!</a:t>
             </a:r>
           </a:p>
           <a:p>

</xml_diff>